<commit_message>
add page to the Bemutato ppt
</commit_message>
<xml_diff>
--- a/Bemutato.pptx
+++ b/Bemutato.pptx
@@ -7,9 +7,9 @@
   <p:sldIdLst>
     <p:sldId id="256" r:id="rId2"/>
     <p:sldId id="257" r:id="rId3"/>
-    <p:sldId id="258" r:id="rId4"/>
-    <p:sldId id="259" r:id="rId5"/>
-    <p:sldId id="260" r:id="rId6"/>
+    <p:sldId id="260" r:id="rId4"/>
+    <p:sldId id="258" r:id="rId5"/>
+    <p:sldId id="259" r:id="rId6"/>
     <p:sldId id="261" r:id="rId7"/>
     <p:sldId id="262" r:id="rId8"/>
     <p:sldId id="263" r:id="rId9"/>
@@ -3821,7 +3821,7 @@
           <a:p>
             <a:fld id="{FA64CA88-A0F0-4D5B-BEA8-B57532FDFF33}" type="datetimeFigureOut">
               <a:rPr lang="hu-HU" smtClean="0"/>
-              <a:t>2024. 03. 13.</a:t>
+              <a:t>2024. 03. 14.</a:t>
             </a:fld>
             <a:endParaRPr lang="hu-HU"/>
           </a:p>
@@ -4019,7 +4019,7 @@
           <a:p>
             <a:fld id="{FA64CA88-A0F0-4D5B-BEA8-B57532FDFF33}" type="datetimeFigureOut">
               <a:rPr lang="hu-HU" smtClean="0"/>
-              <a:t>2024. 03. 13.</a:t>
+              <a:t>2024. 03. 14.</a:t>
             </a:fld>
             <a:endParaRPr lang="hu-HU"/>
           </a:p>
@@ -4227,7 +4227,7 @@
           <a:p>
             <a:fld id="{FA64CA88-A0F0-4D5B-BEA8-B57532FDFF33}" type="datetimeFigureOut">
               <a:rPr lang="hu-HU" smtClean="0"/>
-              <a:t>2024. 03. 13.</a:t>
+              <a:t>2024. 03. 14.</a:t>
             </a:fld>
             <a:endParaRPr lang="hu-HU"/>
           </a:p>
@@ -4425,7 +4425,7 @@
           <a:p>
             <a:fld id="{FA64CA88-A0F0-4D5B-BEA8-B57532FDFF33}" type="datetimeFigureOut">
               <a:rPr lang="hu-HU" smtClean="0"/>
-              <a:t>2024. 03. 13.</a:t>
+              <a:t>2024. 03. 14.</a:t>
             </a:fld>
             <a:endParaRPr lang="hu-HU"/>
           </a:p>
@@ -4700,7 +4700,7 @@
           <a:p>
             <a:fld id="{FA64CA88-A0F0-4D5B-BEA8-B57532FDFF33}" type="datetimeFigureOut">
               <a:rPr lang="hu-HU" smtClean="0"/>
-              <a:t>2024. 03. 13.</a:t>
+              <a:t>2024. 03. 14.</a:t>
             </a:fld>
             <a:endParaRPr lang="hu-HU"/>
           </a:p>
@@ -4965,7 +4965,7 @@
           <a:p>
             <a:fld id="{FA64CA88-A0F0-4D5B-BEA8-B57532FDFF33}" type="datetimeFigureOut">
               <a:rPr lang="hu-HU" smtClean="0"/>
-              <a:t>2024. 03. 13.</a:t>
+              <a:t>2024. 03. 14.</a:t>
             </a:fld>
             <a:endParaRPr lang="hu-HU"/>
           </a:p>
@@ -5377,7 +5377,7 @@
           <a:p>
             <a:fld id="{FA64CA88-A0F0-4D5B-BEA8-B57532FDFF33}" type="datetimeFigureOut">
               <a:rPr lang="hu-HU" smtClean="0"/>
-              <a:t>2024. 03. 13.</a:t>
+              <a:t>2024. 03. 14.</a:t>
             </a:fld>
             <a:endParaRPr lang="hu-HU"/>
           </a:p>
@@ -5518,7 +5518,7 @@
           <a:p>
             <a:fld id="{FA64CA88-A0F0-4D5B-BEA8-B57532FDFF33}" type="datetimeFigureOut">
               <a:rPr lang="hu-HU" smtClean="0"/>
-              <a:t>2024. 03. 13.</a:t>
+              <a:t>2024. 03. 14.</a:t>
             </a:fld>
             <a:endParaRPr lang="hu-HU"/>
           </a:p>
@@ -5631,7 +5631,7 @@
           <a:p>
             <a:fld id="{FA64CA88-A0F0-4D5B-BEA8-B57532FDFF33}" type="datetimeFigureOut">
               <a:rPr lang="hu-HU" smtClean="0"/>
-              <a:t>2024. 03. 13.</a:t>
+              <a:t>2024. 03. 14.</a:t>
             </a:fld>
             <a:endParaRPr lang="hu-HU"/>
           </a:p>
@@ -5942,7 +5942,7 @@
           <a:p>
             <a:fld id="{FA64CA88-A0F0-4D5B-BEA8-B57532FDFF33}" type="datetimeFigureOut">
               <a:rPr lang="hu-HU" smtClean="0"/>
-              <a:t>2024. 03. 13.</a:t>
+              <a:t>2024. 03. 14.</a:t>
             </a:fld>
             <a:endParaRPr lang="hu-HU"/>
           </a:p>
@@ -6230,7 +6230,7 @@
           <a:p>
             <a:fld id="{FA64CA88-A0F0-4D5B-BEA8-B57532FDFF33}" type="datetimeFigureOut">
               <a:rPr lang="hu-HU" smtClean="0"/>
-              <a:t>2024. 03. 13.</a:t>
+              <a:t>2024. 03. 14.</a:t>
             </a:fld>
             <a:endParaRPr lang="hu-HU"/>
           </a:p>
@@ -6471,7 +6471,7 @@
           <a:p>
             <a:fld id="{FA64CA88-A0F0-4D5B-BEA8-B57532FDFF33}" type="datetimeFigureOut">
               <a:rPr lang="hu-HU" smtClean="0"/>
-              <a:t>2024. 03. 13.</a:t>
+              <a:t>2024. 03. 14.</a:t>
             </a:fld>
             <a:endParaRPr lang="hu-HU"/>
           </a:p>
@@ -7809,6 +7809,182 @@
 <file path=ppt/slides/slide3.xml><?xml version="1.0" encoding="utf-8"?>
 <p:sld xmlns:a="http://schemas.openxmlformats.org/drawingml/2006/main" xmlns:r="http://schemas.openxmlformats.org/officeDocument/2006/relationships" xmlns:p="http://schemas.openxmlformats.org/presentationml/2006/main">
   <p:cSld>
+    <p:spTree>
+      <p:nvGrpSpPr>
+        <p:cNvPr id="1" name=""/>
+        <p:cNvGrpSpPr/>
+        <p:nvPr/>
+      </p:nvGrpSpPr>
+      <p:grpSpPr>
+        <a:xfrm>
+          <a:off x="0" y="0"/>
+          <a:ext cx="0" cy="0"/>
+          <a:chOff x="0" y="0"/>
+          <a:chExt cx="0" cy="0"/>
+        </a:xfrm>
+      </p:grpSpPr>
+      <p:sp>
+        <p:nvSpPr>
+          <p:cNvPr id="2" name="Cím 1">
+            <a:extLst>
+              <a:ext uri="{FF2B5EF4-FFF2-40B4-BE49-F238E27FC236}">
+                <a16:creationId xmlns:a16="http://schemas.microsoft.com/office/drawing/2014/main" id="{FD2D685A-5721-75A5-764F-FD7DD4DEF420}"/>
+              </a:ext>
+            </a:extLst>
+          </p:cNvPr>
+          <p:cNvSpPr>
+            <a:spLocks noGrp="1"/>
+          </p:cNvSpPr>
+          <p:nvPr>
+            <p:ph type="title"/>
+          </p:nvPr>
+        </p:nvSpPr>
+        <p:spPr/>
+        <p:txBody>
+          <a:bodyPr/>
+          <a:lstStyle/>
+          <a:p>
+            <a:r>
+              <a:rPr lang="hu-HU" dirty="0">
+                <a:latin typeface="Arial" panose="020B0604020202020204" pitchFamily="34" charset="0"/>
+                <a:cs typeface="Arial" panose="020B0604020202020204" pitchFamily="34" charset="0"/>
+              </a:rPr>
+              <a:t>Miért pont MongoDB? </a:t>
+            </a:r>
+          </a:p>
+        </p:txBody>
+      </p:sp>
+      <p:pic>
+        <p:nvPicPr>
+          <p:cNvPr id="1026" name="Picture 2" descr="What is MongoDB? NoSQL database explained in an easy way.">
+            <a:extLst>
+              <a:ext uri="{FF2B5EF4-FFF2-40B4-BE49-F238E27FC236}">
+                <a16:creationId xmlns:a16="http://schemas.microsoft.com/office/drawing/2014/main" id="{C5EDB69C-19AF-4970-B187-CE8888273996}"/>
+              </a:ext>
+            </a:extLst>
+          </p:cNvPr>
+          <p:cNvPicPr>
+            <a:picLocks noGrp="1" noChangeAspect="1" noChangeArrowheads="1"/>
+          </p:cNvPicPr>
+          <p:nvPr>
+            <p:ph idx="1"/>
+          </p:nvPr>
+        </p:nvPicPr>
+        <p:blipFill>
+          <a:blip r:embed="rId2">
+            <a:extLst>
+              <a:ext uri="{28A0092B-C50C-407E-A947-70E740481C1C}">
+                <a14:useLocalDpi xmlns:a14="http://schemas.microsoft.com/office/drawing/2010/main" val="0"/>
+              </a:ext>
+            </a:extLst>
+          </a:blip>
+          <a:srcRect/>
+          <a:stretch>
+            <a:fillRect/>
+          </a:stretch>
+        </p:blipFill>
+        <p:spPr bwMode="auto">
+          <a:xfrm>
+            <a:off x="8495036" y="3122274"/>
+            <a:ext cx="2264172" cy="3045262"/>
+          </a:xfrm>
+          <a:prstGeom prst="rect">
+            <a:avLst/>
+          </a:prstGeom>
+          <a:noFill/>
+          <a:extLst>
+            <a:ext uri="{909E8E84-426E-40DD-AFC4-6F175D3DCCD1}">
+              <a14:hiddenFill xmlns:a14="http://schemas.microsoft.com/office/drawing/2010/main">
+                <a:solidFill>
+                  <a:srgbClr val="FFFFFF"/>
+                </a:solidFill>
+              </a14:hiddenFill>
+            </a:ext>
+          </a:extLst>
+        </p:spPr>
+      </p:pic>
+      <p:sp>
+        <p:nvSpPr>
+          <p:cNvPr id="4" name="Szövegdoboz 3">
+            <a:extLst>
+              <a:ext uri="{FF2B5EF4-FFF2-40B4-BE49-F238E27FC236}">
+                <a16:creationId xmlns:a16="http://schemas.microsoft.com/office/drawing/2014/main" id="{8AE775F3-2D2C-4D9B-A4BF-6B18BFA06A6D}"/>
+              </a:ext>
+            </a:extLst>
+          </p:cNvPr>
+          <p:cNvSpPr txBox="1"/>
+          <p:nvPr/>
+        </p:nvSpPr>
+        <p:spPr>
+          <a:xfrm>
+            <a:off x="961053" y="1819469"/>
+            <a:ext cx="6746033" cy="646331"/>
+          </a:xfrm>
+          <a:prstGeom prst="rect">
+            <a:avLst/>
+          </a:prstGeom>
+          <a:noFill/>
+        </p:spPr>
+        <p:txBody>
+          <a:bodyPr wrap="square" rtlCol="0">
+            <a:spAutoFit/>
+          </a:bodyPr>
+          <a:lstStyle/>
+          <a:p>
+            <a:pPr marL="285750" indent="-285750">
+              <a:buFont typeface="Arial" panose="020B0604020202020204" pitchFamily="34" charset="0"/>
+              <a:buChar char="•"/>
+            </a:pPr>
+            <a:r>
+              <a:rPr lang="hu-HU" dirty="0">
+                <a:latin typeface="Arial" panose="020B0604020202020204" pitchFamily="34" charset="0"/>
+                <a:cs typeface="Arial" panose="020B0604020202020204" pitchFamily="34" charset="0"/>
+              </a:rPr>
+              <a:t>NoSQL -&gt; nincs szükség előre meghatározott sémákra</a:t>
+            </a:r>
+          </a:p>
+          <a:p>
+            <a:pPr marL="285750" indent="-285750">
+              <a:buFont typeface="Arial" panose="020B0604020202020204" pitchFamily="34" charset="0"/>
+              <a:buChar char="•"/>
+            </a:pPr>
+            <a:r>
+              <a:rPr lang="hu-HU" dirty="0">
+                <a:latin typeface="Arial" panose="020B0604020202020204" pitchFamily="34" charset="0"/>
+                <a:cs typeface="Arial" panose="020B0604020202020204" pitchFamily="34" charset="0"/>
+              </a:rPr>
+              <a:t>Rugalmasabb, tudja kezelni a </a:t>
+            </a:r>
+            <a:r>
+              <a:rPr lang="hu-HU">
+                <a:latin typeface="Arial" panose="020B0604020202020204" pitchFamily="34" charset="0"/>
+                <a:cs typeface="Arial" panose="020B0604020202020204" pitchFamily="34" charset="0"/>
+              </a:rPr>
+              <a:t>strukturálatlan adatokat  </a:t>
+            </a:r>
+            <a:endParaRPr lang="hu-HU" dirty="0">
+              <a:latin typeface="Arial" panose="020B0604020202020204" pitchFamily="34" charset="0"/>
+              <a:cs typeface="Arial" panose="020B0604020202020204" pitchFamily="34" charset="0"/>
+            </a:endParaRPr>
+          </a:p>
+        </p:txBody>
+      </p:sp>
+    </p:spTree>
+    <p:extLst>
+      <p:ext uri="{BB962C8B-B14F-4D97-AF65-F5344CB8AC3E}">
+        <p14:creationId xmlns:p14="http://schemas.microsoft.com/office/powerpoint/2010/main" val="3144682893"/>
+      </p:ext>
+    </p:extLst>
+  </p:cSld>
+  <p:clrMapOvr>
+    <a:masterClrMapping/>
+  </p:clrMapOvr>
+</p:sld>
+</file>
+
+<file path=ppt/slides/slide4.xml><?xml version="1.0" encoding="utf-8"?>
+<p:sld xmlns:a="http://schemas.openxmlformats.org/drawingml/2006/main" xmlns:r="http://schemas.openxmlformats.org/officeDocument/2006/relationships" xmlns:p="http://schemas.openxmlformats.org/presentationml/2006/main">
+  <p:cSld>
     <p:bg>
       <p:bgPr>
         <a:solidFill>
@@ -8132,7 +8308,7 @@
 </p:sld>
 </file>
 
-<file path=ppt/slides/slide4.xml><?xml version="1.0" encoding="utf-8"?>
+<file path=ppt/slides/slide5.xml><?xml version="1.0" encoding="utf-8"?>
 <p:sld xmlns:a="http://schemas.openxmlformats.org/drawingml/2006/main" xmlns:r="http://schemas.openxmlformats.org/officeDocument/2006/relationships" xmlns:p="http://schemas.openxmlformats.org/presentationml/2006/main">
   <p:cSld>
     <p:bg>
@@ -8388,86 +8564,6 @@
     <p:extLst>
       <p:ext uri="{BB962C8B-B14F-4D97-AF65-F5344CB8AC3E}">
         <p14:creationId xmlns:p14="http://schemas.microsoft.com/office/powerpoint/2010/main" val="3492682951"/>
-      </p:ext>
-    </p:extLst>
-  </p:cSld>
-  <p:clrMapOvr>
-    <a:masterClrMapping/>
-  </p:clrMapOvr>
-</p:sld>
-</file>
-
-<file path=ppt/slides/slide5.xml><?xml version="1.0" encoding="utf-8"?>
-<p:sld xmlns:a="http://schemas.openxmlformats.org/drawingml/2006/main" xmlns:r="http://schemas.openxmlformats.org/officeDocument/2006/relationships" xmlns:p="http://schemas.openxmlformats.org/presentationml/2006/main">
-  <p:cSld>
-    <p:spTree>
-      <p:nvGrpSpPr>
-        <p:cNvPr id="1" name=""/>
-        <p:cNvGrpSpPr/>
-        <p:nvPr/>
-      </p:nvGrpSpPr>
-      <p:grpSpPr>
-        <a:xfrm>
-          <a:off x="0" y="0"/>
-          <a:ext cx="0" cy="0"/>
-          <a:chOff x="0" y="0"/>
-          <a:chExt cx="0" cy="0"/>
-        </a:xfrm>
-      </p:grpSpPr>
-      <p:sp>
-        <p:nvSpPr>
-          <p:cNvPr id="2" name="Cím 1">
-            <a:extLst>
-              <a:ext uri="{FF2B5EF4-FFF2-40B4-BE49-F238E27FC236}">
-                <a16:creationId xmlns:a16="http://schemas.microsoft.com/office/drawing/2014/main" id="{FD2D685A-5721-75A5-764F-FD7DD4DEF420}"/>
-              </a:ext>
-            </a:extLst>
-          </p:cNvPr>
-          <p:cNvSpPr>
-            <a:spLocks noGrp="1"/>
-          </p:cNvSpPr>
-          <p:nvPr>
-            <p:ph type="title"/>
-          </p:nvPr>
-        </p:nvSpPr>
-        <p:spPr/>
-        <p:txBody>
-          <a:bodyPr/>
-          <a:lstStyle/>
-          <a:p>
-            <a:endParaRPr lang="hu-HU"/>
-          </a:p>
-        </p:txBody>
-      </p:sp>
-      <p:sp>
-        <p:nvSpPr>
-          <p:cNvPr id="3" name="Tartalom helye 2">
-            <a:extLst>
-              <a:ext uri="{FF2B5EF4-FFF2-40B4-BE49-F238E27FC236}">
-                <a16:creationId xmlns:a16="http://schemas.microsoft.com/office/drawing/2014/main" id="{CECCB3CF-096A-87D5-5E26-3F29C9B27EDB}"/>
-              </a:ext>
-            </a:extLst>
-          </p:cNvPr>
-          <p:cNvSpPr>
-            <a:spLocks noGrp="1"/>
-          </p:cNvSpPr>
-          <p:nvPr>
-            <p:ph idx="1"/>
-          </p:nvPr>
-        </p:nvSpPr>
-        <p:spPr/>
-        <p:txBody>
-          <a:bodyPr/>
-          <a:lstStyle/>
-          <a:p>
-            <a:endParaRPr lang="hu-HU"/>
-          </a:p>
-        </p:txBody>
-      </p:sp>
-    </p:spTree>
-    <p:extLst>
-      <p:ext uri="{BB962C8B-B14F-4D97-AF65-F5344CB8AC3E}">
-        <p14:creationId xmlns:p14="http://schemas.microsoft.com/office/powerpoint/2010/main" val="3144682893"/>
       </p:ext>
     </p:extLst>
   </p:cSld>

</xml_diff>

<commit_message>
Bemutato powerpoint database pages
</commit_message>
<xml_diff>
--- a/Bemutato.pptx
+++ b/Bemutato.pptx
@@ -1046,7 +1046,7 @@
 <dgm:dataModel xmlns:dgm="http://schemas.openxmlformats.org/drawingml/2006/diagram" xmlns:a="http://schemas.openxmlformats.org/drawingml/2006/main">
   <dgm:ptLst>
     <dgm:pt modelId="{FDC28ED3-693D-4854-A654-FCC5EAA3058D}" type="doc">
-      <dgm:prSet loTypeId="urn:microsoft.com/office/officeart/2016/7/layout/RepeatingBendingProcessNew" loCatId="process" qsTypeId="urn:microsoft.com/office/officeart/2005/8/quickstyle/simple4" qsCatId="simple" csTypeId="urn:microsoft.com/office/officeart/2005/8/colors/colorful1" csCatId="colorful"/>
+      <dgm:prSet loTypeId="urn:microsoft.com/office/officeart/2016/7/layout/RepeatingBendingProcessNew" loCatId="process" qsTypeId="urn:microsoft.com/office/officeart/2005/8/quickstyle/simple4" qsCatId="simple" csTypeId="urn:microsoft.com/office/officeart/2005/8/colors/colorful1" csCatId="colorful" phldr="1"/>
       <dgm:spPr/>
       <dgm:t>
         <a:bodyPr/>
@@ -1064,10 +1064,10 @@
         <a:lstStyle/>
         <a:p>
           <a:r>
-            <a:rPr lang="hu-HU"/>
-            <a:t>Projektünk célja egy webshop létrehozása, melyen a felhasználók számítógép alkatrészeket, különböző hardware elemeket tudnak vásárolni.</a:t>
+            <a:rPr lang="hu-HU" dirty="0"/>
+            <a:t>Projektünk célja egy webshop létrehozása, melyen a felhasználók számítógép alkatrészeket, különböző hardver elemeket tudnak vásárolni.</a:t>
           </a:r>
-          <a:endParaRPr lang="en-US"/>
+          <a:endParaRPr lang="en-US" dirty="0"/>
         </a:p>
       </dgm:t>
     </dgm:pt>
@@ -1212,10 +1212,10 @@
         <a:lstStyle/>
         <a:p>
           <a:r>
-            <a:rPr lang="hu-HU"/>
-            <a:t>A funkció lehetőséget biztosít a felhasználók számára, hogy ezen a hardware elemeket akár kedvezőbb áron szerezzék be. </a:t>
+            <a:rPr lang="hu-HU" dirty="0"/>
+            <a:t>A funkció lehetőséget biztosít a felhasználók számára, hogy ezen a hardver elemeket akár kedvezőbb áron szerezzék be. </a:t>
           </a:r>
-          <a:endParaRPr lang="en-US"/>
+          <a:endParaRPr lang="en-US" dirty="0"/>
         </a:p>
       </dgm:t>
     </dgm:pt>
@@ -1605,10 +1605,10 @@
             <a:buNone/>
           </a:pPr>
           <a:r>
-            <a:rPr lang="hu-HU" sz="1800" kern="1200"/>
-            <a:t>Projektünk célja egy webshop létrehozása, melyen a felhasználók számítógép alkatrészeket, különböző hardware elemeket tudnak vásárolni.</a:t>
+            <a:rPr lang="hu-HU" sz="1800" kern="1200" dirty="0"/>
+            <a:t>Projektünk célja egy webshop létrehozása, melyen a felhasználók számítógép alkatrészeket, különböző hardver elemeket tudnak vásárolni.</a:t>
           </a:r>
-          <a:endParaRPr lang="en-US" sz="1800" kern="1200"/>
+          <a:endParaRPr lang="en-US" sz="1800" kern="1200" dirty="0"/>
         </a:p>
       </dsp:txBody>
       <dsp:txXfrm>
@@ -2335,10 +2335,10 @@
             <a:buNone/>
           </a:pPr>
           <a:r>
-            <a:rPr lang="hu-HU" sz="1800" kern="1200"/>
-            <a:t>A funkció lehetőséget biztosít a felhasználók számára, hogy ezen a hardware elemeket akár kedvezőbb áron szerezzék be. </a:t>
+            <a:rPr lang="hu-HU" sz="1800" kern="1200" dirty="0"/>
+            <a:t>A funkció lehetőséget biztosít a felhasználók számára, hogy ezen a hardver elemeket akár kedvezőbb áron szerezzék be. </a:t>
           </a:r>
-          <a:endParaRPr lang="en-US" sz="1800" kern="1200"/>
+          <a:endParaRPr lang="en-US" sz="1800" kern="1200" dirty="0"/>
         </a:p>
       </dsp:txBody>
       <dsp:txXfrm>
@@ -3758,7 +3758,7 @@
           <a:p>
             <a:fld id="{F3967C4F-389E-4158-BF12-0F45FCA2644D}" type="datetimeFigureOut">
               <a:rPr lang="hu-HU" smtClean="0"/>
-              <a:t>2024. 03. 16.</a:t>
+              <a:t>2024. 03. 17.</a:t>
             </a:fld>
             <a:endParaRPr lang="hu-HU"/>
           </a:p>
@@ -4256,7 +4256,7 @@
           <a:p>
             <a:fld id="{FA64CA88-A0F0-4D5B-BEA8-B57532FDFF33}" type="datetimeFigureOut">
               <a:rPr lang="hu-HU" smtClean="0"/>
-              <a:t>2024. 03. 16.</a:t>
+              <a:t>2024. 03. 17.</a:t>
             </a:fld>
             <a:endParaRPr lang="hu-HU"/>
           </a:p>
@@ -4454,7 +4454,7 @@
           <a:p>
             <a:fld id="{FA64CA88-A0F0-4D5B-BEA8-B57532FDFF33}" type="datetimeFigureOut">
               <a:rPr lang="hu-HU" smtClean="0"/>
-              <a:t>2024. 03. 16.</a:t>
+              <a:t>2024. 03. 17.</a:t>
             </a:fld>
             <a:endParaRPr lang="hu-HU"/>
           </a:p>
@@ -4662,7 +4662,7 @@
           <a:p>
             <a:fld id="{FA64CA88-A0F0-4D5B-BEA8-B57532FDFF33}" type="datetimeFigureOut">
               <a:rPr lang="hu-HU" smtClean="0"/>
-              <a:t>2024. 03. 16.</a:t>
+              <a:t>2024. 03. 17.</a:t>
             </a:fld>
             <a:endParaRPr lang="hu-HU"/>
           </a:p>
@@ -4860,7 +4860,7 @@
           <a:p>
             <a:fld id="{FA64CA88-A0F0-4D5B-BEA8-B57532FDFF33}" type="datetimeFigureOut">
               <a:rPr lang="hu-HU" smtClean="0"/>
-              <a:t>2024. 03. 16.</a:t>
+              <a:t>2024. 03. 17.</a:t>
             </a:fld>
             <a:endParaRPr lang="hu-HU"/>
           </a:p>
@@ -5135,7 +5135,7 @@
           <a:p>
             <a:fld id="{FA64CA88-A0F0-4D5B-BEA8-B57532FDFF33}" type="datetimeFigureOut">
               <a:rPr lang="hu-HU" smtClean="0"/>
-              <a:t>2024. 03. 16.</a:t>
+              <a:t>2024. 03. 17.</a:t>
             </a:fld>
             <a:endParaRPr lang="hu-HU"/>
           </a:p>
@@ -5400,7 +5400,7 @@
           <a:p>
             <a:fld id="{FA64CA88-A0F0-4D5B-BEA8-B57532FDFF33}" type="datetimeFigureOut">
               <a:rPr lang="hu-HU" smtClean="0"/>
-              <a:t>2024. 03. 16.</a:t>
+              <a:t>2024. 03. 17.</a:t>
             </a:fld>
             <a:endParaRPr lang="hu-HU"/>
           </a:p>
@@ -5812,7 +5812,7 @@
           <a:p>
             <a:fld id="{FA64CA88-A0F0-4D5B-BEA8-B57532FDFF33}" type="datetimeFigureOut">
               <a:rPr lang="hu-HU" smtClean="0"/>
-              <a:t>2024. 03. 16.</a:t>
+              <a:t>2024. 03. 17.</a:t>
             </a:fld>
             <a:endParaRPr lang="hu-HU"/>
           </a:p>
@@ -5953,7 +5953,7 @@
           <a:p>
             <a:fld id="{FA64CA88-A0F0-4D5B-BEA8-B57532FDFF33}" type="datetimeFigureOut">
               <a:rPr lang="hu-HU" smtClean="0"/>
-              <a:t>2024. 03. 16.</a:t>
+              <a:t>2024. 03. 17.</a:t>
             </a:fld>
             <a:endParaRPr lang="hu-HU"/>
           </a:p>
@@ -6066,7 +6066,7 @@
           <a:p>
             <a:fld id="{FA64CA88-A0F0-4D5B-BEA8-B57532FDFF33}" type="datetimeFigureOut">
               <a:rPr lang="hu-HU" smtClean="0"/>
-              <a:t>2024. 03. 16.</a:t>
+              <a:t>2024. 03. 17.</a:t>
             </a:fld>
             <a:endParaRPr lang="hu-HU"/>
           </a:p>
@@ -6377,7 +6377,7 @@
           <a:p>
             <a:fld id="{FA64CA88-A0F0-4D5B-BEA8-B57532FDFF33}" type="datetimeFigureOut">
               <a:rPr lang="hu-HU" smtClean="0"/>
-              <a:t>2024. 03. 16.</a:t>
+              <a:t>2024. 03. 17.</a:t>
             </a:fld>
             <a:endParaRPr lang="hu-HU"/>
           </a:p>
@@ -6665,7 +6665,7 @@
           <a:p>
             <a:fld id="{FA64CA88-A0F0-4D5B-BEA8-B57532FDFF33}" type="datetimeFigureOut">
               <a:rPr lang="hu-HU" smtClean="0"/>
-              <a:t>2024. 03. 16.</a:t>
+              <a:t>2024. 03. 17.</a:t>
             </a:fld>
             <a:endParaRPr lang="hu-HU"/>
           </a:p>
@@ -6906,7 +6906,7 @@
           <a:p>
             <a:fld id="{FA64CA88-A0F0-4D5B-BEA8-B57532FDFF33}" type="datetimeFigureOut">
               <a:rPr lang="hu-HU" smtClean="0"/>
-              <a:t>2024. 03. 16.</a:t>
+              <a:t>2024. 03. 17.</a:t>
             </a:fld>
             <a:endParaRPr lang="hu-HU"/>
           </a:p>
@@ -7621,6 +7621,18 @@
   <p:clrMapOvr>
     <a:masterClrMapping/>
   </p:clrMapOvr>
+  <mc:AlternateContent xmlns:mc="http://schemas.openxmlformats.org/markup-compatibility/2006">
+    <mc:Choice xmlns:p14="http://schemas.microsoft.com/office/powerpoint/2010/main" Requires="p14">
+      <p:transition spd="slow" p14:dur="3400">
+        <p14:reveal/>
+      </p:transition>
+    </mc:Choice>
+    <mc:Fallback>
+      <p:transition spd="slow">
+        <p:fade/>
+      </p:transition>
+    </mc:Fallback>
+  </mc:AlternateContent>
 </p:sld>
 </file>
 
@@ -7837,7 +7849,7 @@
             <p:ph idx="1"/>
             <p:extLst>
               <p:ext uri="{D42A27DB-BD31-4B8C-83A1-F6EECF244321}">
-                <p14:modId xmlns:p14="http://schemas.microsoft.com/office/powerpoint/2010/main" val="2388089171"/>
+                <p14:modId xmlns:p14="http://schemas.microsoft.com/office/powerpoint/2010/main" val="1340742855"/>
               </p:ext>
             </p:extLst>
           </p:nvPr>
@@ -7862,6 +7874,9 @@
   <p:clrMapOvr>
     <a:masterClrMapping/>
   </p:clrMapOvr>
+  <p:transition spd="med">
+    <p:pull/>
+  </p:transition>
 </p:sld>
 </file>
 
@@ -8516,7 +8531,7 @@
             <a:pPr marL="285750"/>
             <a:r>
               <a:rPr lang="hu-HU" sz="2200" dirty="0"/>
-              <a:t>Kevesebb szigorú követelménynek kell megfelelni mint egy relációs adatbázisnál</a:t>
+              <a:t>Kevesebb szigorú követelménynek kell megfelelni mint egy relációs adatbázisnál (Nem táblákra rendeződnek az adatok)</a:t>
             </a:r>
           </a:p>
           <a:p>
@@ -8558,6 +8573,9 @@
   <p:clrMapOvr>
     <a:masterClrMapping/>
   </p:clrMapOvr>
+  <p:transition spd="med">
+    <p:pull/>
+  </p:transition>
 </p:sld>
 </file>
 
@@ -8815,6 +8833,9 @@
   <p:clrMapOvr>
     <a:masterClrMapping/>
   </p:clrMapOvr>
+  <p:transition spd="med">
+    <p:pull/>
+  </p:transition>
 </p:sld>
 </file>
 
@@ -8857,8 +8878,8 @@
         </p:blipFill>
         <p:spPr>
           <a:xfrm>
-            <a:off x="1" y="0"/>
-            <a:ext cx="12192000" cy="6858000"/>
+            <a:off x="0" y="0"/>
+            <a:ext cx="12191999" cy="6858000"/>
           </a:xfrm>
           <a:prstGeom prst="rect">
             <a:avLst/>
@@ -8875,12 +8896,23 @@
   <p:clrMapOvr>
     <a:masterClrMapping/>
   </p:clrMapOvr>
+  <p:transition spd="med">
+    <p:pull/>
+  </p:transition>
 </p:sld>
 </file>
 
 <file path=ppt/slides/slide6.xml><?xml version="1.0" encoding="utf-8"?>
 <p:sld xmlns:a="http://schemas.openxmlformats.org/drawingml/2006/main" xmlns:r="http://schemas.openxmlformats.org/officeDocument/2006/relationships" xmlns:p="http://schemas.openxmlformats.org/presentationml/2006/main">
   <p:cSld>
+    <p:bg>
+      <p:bgPr>
+        <a:solidFill>
+          <a:schemeClr val="bg1"/>
+        </a:solidFill>
+        <a:effectLst/>
+      </p:bgPr>
+    </p:bg>
     <p:spTree>
       <p:nvGrpSpPr>
         <p:cNvPr id="1" name=""/>
@@ -8895,56 +8927,45 @@
           <a:chExt cx="0" cy="0"/>
         </a:xfrm>
       </p:grpSpPr>
-      <p:sp>
-        <p:nvSpPr>
-          <p:cNvPr id="2" name="Cím 1">
+      <p:pic>
+        <p:nvPicPr>
+          <p:cNvPr id="4" name="Tartalom helye 3" descr="A képen szöveg, diagram, sor, kör látható&#10;&#10;Automatikusan generált leírás">
             <a:extLst>
               <a:ext uri="{FF2B5EF4-FFF2-40B4-BE49-F238E27FC236}">
-                <a16:creationId xmlns:a16="http://schemas.microsoft.com/office/drawing/2014/main" id="{A30CBDBA-E5FA-F27B-5843-2A1811424866}"/>
+                <a16:creationId xmlns:a16="http://schemas.microsoft.com/office/drawing/2014/main" id="{3AA73C86-DD57-A6F5-6F9A-D643E4265ADA}"/>
               </a:ext>
             </a:extLst>
           </p:cNvPr>
-          <p:cNvSpPr>
-            <a:spLocks noGrp="1"/>
-          </p:cNvSpPr>
-          <p:nvPr>
-            <p:ph type="title"/>
-          </p:nvPr>
-        </p:nvSpPr>
-        <p:spPr/>
-        <p:txBody>
-          <a:bodyPr/>
-          <a:lstStyle/>
-          <a:p>
-            <a:endParaRPr lang="hu-HU"/>
-          </a:p>
-        </p:txBody>
-      </p:sp>
-      <p:sp>
-        <p:nvSpPr>
-          <p:cNvPr id="3" name="Tartalom helye 2">
-            <a:extLst>
-              <a:ext uri="{FF2B5EF4-FFF2-40B4-BE49-F238E27FC236}">
-                <a16:creationId xmlns:a16="http://schemas.microsoft.com/office/drawing/2014/main" id="{EB8168B1-73BE-94F9-C005-28778B7194C6}"/>
-              </a:ext>
-            </a:extLst>
-          </p:cNvPr>
-          <p:cNvSpPr>
-            <a:spLocks noGrp="1"/>
-          </p:cNvSpPr>
+          <p:cNvPicPr>
+            <a:picLocks noGrp="1" noChangeAspect="1"/>
+          </p:cNvPicPr>
           <p:nvPr>
             <p:ph idx="1"/>
           </p:nvPr>
-        </p:nvSpPr>
-        <p:spPr/>
-        <p:txBody>
-          <a:bodyPr/>
-          <a:lstStyle/>
-          <a:p>
-            <a:endParaRPr lang="hu-HU"/>
-          </a:p>
-        </p:txBody>
-      </p:sp>
+        </p:nvPicPr>
+        <p:blipFill>
+          <a:blip r:embed="rId2">
+            <a:extLst>
+              <a:ext uri="{28A0092B-C50C-407E-A947-70E740481C1C}">
+                <a14:useLocalDpi xmlns:a14="http://schemas.microsoft.com/office/drawing/2010/main" val="0"/>
+              </a:ext>
+            </a:extLst>
+          </a:blip>
+          <a:stretch>
+            <a:fillRect/>
+          </a:stretch>
+        </p:blipFill>
+        <p:spPr bwMode="auto">
+          <a:xfrm>
+            <a:off x="2735781" y="643466"/>
+            <a:ext cx="6720437" cy="5571067"/>
+          </a:xfrm>
+          <a:prstGeom prst="rect">
+            <a:avLst/>
+          </a:prstGeom>
+          <a:noFill/>
+        </p:spPr>
+      </p:pic>
     </p:spTree>
     <p:extLst>
       <p:ext uri="{BB962C8B-B14F-4D97-AF65-F5344CB8AC3E}">
@@ -8955,6 +8976,9 @@
   <p:clrMapOvr>
     <a:masterClrMapping/>
   </p:clrMapOvr>
+  <p:transition spd="med">
+    <p:pull/>
+  </p:transition>
 </p:sld>
 </file>
 

</xml_diff>

<commit_message>
update powerpoint database page
</commit_message>
<xml_diff>
--- a/Bemutato.pptx
+++ b/Bemutato.pptx
@@ -4132,13 +4132,8 @@
             </a:pPr>
             <a:r>
               <a:rPr lang="hu-HU" sz="1200" dirty="0"/>
-              <a:t>Növekvő adatok kezelése könnyebb, kiváló teljesítmény sok felhasználó </a:t>
+              <a:t>Növekvő adatok kezelése könnyebb, kiváló teljesítmény sok felhasználó alatt is</a:t>
             </a:r>
-            <a:r>
-              <a:rPr lang="hu-HU" sz="1200"/>
-              <a:t>alatt is.</a:t>
-            </a:r>
-            <a:endParaRPr lang="hu-HU" sz="1200" dirty="0"/>
           </a:p>
           <a:p>
             <a:endParaRPr lang="hu-HU" dirty="0"/>
@@ -8619,7 +8614,7 @@
             <a:round/>
             <a:extLst>
               <a:ext uri="{C807C97D-BFC1-408E-A445-0C87EB9F89A2}">
-                <ask:lineSketchStyleProps xmlns="" xmlns:ask="http://schemas.microsoft.com/office/drawing/2018/sketchyshapes" sd="2727557108">
+                <ask:lineSketchStyleProps xmlns:ask="http://schemas.microsoft.com/office/drawing/2018/sketchyshapes" xmlns="" sd="2727557108">
                   <a:prstGeom prst="rect">
                     <a:avLst/>
                   </a:prstGeom>

</xml_diff>